<commit_message>
Updated Dalek props data model
</commit_message>
<xml_diff>
--- a/presentation/Doctor Who Data Model.pptx
+++ b/presentation/Doctor Who Data Model.pptx
@@ -7,7 +7,7 @@
   <p:sldIdLst>
     <p:sldId id="265" r:id="rId2"/>
     <p:sldId id="257" r:id="rId3"/>
-    <p:sldId id="258" r:id="rId4"/>
+    <p:sldId id="266" r:id="rId4"/>
     <p:sldId id="259" r:id="rId5"/>
     <p:sldId id="260" r:id="rId6"/>
     <p:sldId id="261" r:id="rId7"/>
@@ -296,7 +296,7 @@
           <a:p>
             <a:fld id="{6E5CF046-20FD-D64B-A873-CF2D1969ADA3}" type="datetimeFigureOut">
               <a:rPr lang="en-US" smtClean="0"/>
-              <a:t>08/05/2012</a:t>
+              <a:t>09/05/2012</a:t>
             </a:fld>
             <a:endParaRPr lang="en-US"/>
           </a:p>
@@ -466,7 +466,7 @@
           <a:p>
             <a:fld id="{6E5CF046-20FD-D64B-A873-CF2D1969ADA3}" type="datetimeFigureOut">
               <a:rPr lang="en-US" smtClean="0"/>
-              <a:t>08/05/2012</a:t>
+              <a:t>09/05/2012</a:t>
             </a:fld>
             <a:endParaRPr lang="en-US"/>
           </a:p>
@@ -646,7 +646,7 @@
           <a:p>
             <a:fld id="{6E5CF046-20FD-D64B-A873-CF2D1969ADA3}" type="datetimeFigureOut">
               <a:rPr lang="en-US" smtClean="0"/>
-              <a:t>08/05/2012</a:t>
+              <a:t>09/05/2012</a:t>
             </a:fld>
             <a:endParaRPr lang="en-US"/>
           </a:p>
@@ -816,7 +816,7 @@
           <a:p>
             <a:fld id="{6E5CF046-20FD-D64B-A873-CF2D1969ADA3}" type="datetimeFigureOut">
               <a:rPr lang="en-US" smtClean="0"/>
-              <a:t>08/05/2012</a:t>
+              <a:t>09/05/2012</a:t>
             </a:fld>
             <a:endParaRPr lang="en-US"/>
           </a:p>
@@ -1062,7 +1062,7 @@
           <a:p>
             <a:fld id="{6E5CF046-20FD-D64B-A873-CF2D1969ADA3}" type="datetimeFigureOut">
               <a:rPr lang="en-US" smtClean="0"/>
-              <a:t>08/05/2012</a:t>
+              <a:t>09/05/2012</a:t>
             </a:fld>
             <a:endParaRPr lang="en-US"/>
           </a:p>
@@ -1350,7 +1350,7 @@
           <a:p>
             <a:fld id="{6E5CF046-20FD-D64B-A873-CF2D1969ADA3}" type="datetimeFigureOut">
               <a:rPr lang="en-US" smtClean="0"/>
-              <a:t>08/05/2012</a:t>
+              <a:t>09/05/2012</a:t>
             </a:fld>
             <a:endParaRPr lang="en-US"/>
           </a:p>
@@ -1772,7 +1772,7 @@
           <a:p>
             <a:fld id="{6E5CF046-20FD-D64B-A873-CF2D1969ADA3}" type="datetimeFigureOut">
               <a:rPr lang="en-US" smtClean="0"/>
-              <a:t>08/05/2012</a:t>
+              <a:t>09/05/2012</a:t>
             </a:fld>
             <a:endParaRPr lang="en-US"/>
           </a:p>
@@ -1890,7 +1890,7 @@
           <a:p>
             <a:fld id="{6E5CF046-20FD-D64B-A873-CF2D1969ADA3}" type="datetimeFigureOut">
               <a:rPr lang="en-US" smtClean="0"/>
-              <a:t>08/05/2012</a:t>
+              <a:t>09/05/2012</a:t>
             </a:fld>
             <a:endParaRPr lang="en-US"/>
           </a:p>
@@ -1985,7 +1985,7 @@
           <a:p>
             <a:fld id="{6E5CF046-20FD-D64B-A873-CF2D1969ADA3}" type="datetimeFigureOut">
               <a:rPr lang="en-US" smtClean="0"/>
-              <a:t>08/05/2012</a:t>
+              <a:t>09/05/2012</a:t>
             </a:fld>
             <a:endParaRPr lang="en-US"/>
           </a:p>
@@ -2262,7 +2262,7 @@
           <a:p>
             <a:fld id="{6E5CF046-20FD-D64B-A873-CF2D1969ADA3}" type="datetimeFigureOut">
               <a:rPr lang="en-US" smtClean="0"/>
-              <a:t>08/05/2012</a:t>
+              <a:t>09/05/2012</a:t>
             </a:fld>
             <a:endParaRPr lang="en-US"/>
           </a:p>
@@ -2515,7 +2515,7 @@
           <a:p>
             <a:fld id="{6E5CF046-20FD-D64B-A873-CF2D1969ADA3}" type="datetimeFigureOut">
               <a:rPr lang="en-US" smtClean="0"/>
-              <a:t>08/05/2012</a:t>
+              <a:t>09/05/2012</a:t>
             </a:fld>
             <a:endParaRPr lang="en-US"/>
           </a:p>
@@ -2728,7 +2728,7 @@
           <a:p>
             <a:fld id="{6E5CF046-20FD-D64B-A873-CF2D1969ADA3}" type="datetimeFigureOut">
               <a:rPr lang="en-US" smtClean="0"/>
-              <a:t>08/05/2012</a:t>
+              <a:t>09/05/2012</a:t>
             </a:fld>
             <a:endParaRPr lang="en-US"/>
           </a:p>
@@ -3136,14 +3136,14 @@
             <p:ph idx="1"/>
             <p:extLst>
               <p:ext uri="{D42A27DB-BD31-4B8C-83A1-F6EECF244321}">
-                <p14:modId xmlns:p14="http://schemas.microsoft.com/office/powerpoint/2010/main" val="3522688423"/>
+                <p14:modId xmlns:p14="http://schemas.microsoft.com/office/powerpoint/2010/main" val="2061908314"/>
               </p:ext>
             </p:extLst>
           </p:nvPr>
         </p:nvGraphicFramePr>
         <p:xfrm>
           <a:off x="457200" y="1600200"/>
-          <a:ext cx="8229600" cy="4048759"/>
+          <a:ext cx="8229601" cy="4048759"/>
         </p:xfrm>
         <a:graphic>
           <a:graphicData uri="http://schemas.openxmlformats.org/drawingml/2006/table">
@@ -3152,8 +3152,9 @@
                 <a:tableStyleId>{5C22544A-7EE6-4342-B048-85BDC9FD1C3A}</a:tableStyleId>
               </a:tblPr>
               <a:tblGrid>
-                <a:gridCol w="1902904"/>
-                <a:gridCol w="6326696"/>
+                <a:gridCol w="1557559"/>
+                <a:gridCol w="1737850"/>
+                <a:gridCol w="4934192"/>
               </a:tblGrid>
               <a:tr h="370840">
                 <a:tc>
@@ -3164,6 +3165,20 @@
                       <a:r>
                         <a:rPr lang="en-US" dirty="0" smtClean="0"/>
                         <a:t>Index</a:t>
+                      </a:r>
+                      <a:endParaRPr lang="en-US" dirty="0"/>
+                    </a:p>
+                  </a:txBody>
+                  <a:tcPr/>
+                </a:tc>
+                <a:tc>
+                  <a:txBody>
+                    <a:bodyPr/>
+                    <a:lstStyle/>
+                    <a:p>
+                      <a:r>
+                        <a:rPr lang="en-US" dirty="0" smtClean="0"/>
+                        <a:t>Key</a:t>
                       </a:r>
                       <a:endParaRPr lang="en-US" dirty="0"/>
                     </a:p>
@@ -3207,6 +3222,20 @@
                     <a:p>
                       <a:r>
                         <a:rPr lang="en-US" dirty="0" smtClean="0"/>
+                        <a:t>actor</a:t>
+                      </a:r>
+                      <a:endParaRPr lang="en-US" dirty="0" smtClean="0"/>
+                    </a:p>
+                  </a:txBody>
+                  <a:tcPr/>
+                </a:tc>
+                <a:tc>
+                  <a:txBody>
+                    <a:bodyPr/>
+                    <a:lstStyle/>
+                    <a:p>
+                      <a:r>
+                        <a:rPr lang="en-US" dirty="0" smtClean="0"/>
                         <a:t>actor = ‘David Tennant’</a:t>
                       </a:r>
                     </a:p>
@@ -3223,6 +3252,20 @@
                       <a:r>
                         <a:rPr lang="en-US" dirty="0" smtClean="0"/>
                         <a:t>characters</a:t>
+                      </a:r>
+                      <a:endParaRPr lang="en-US" dirty="0"/>
+                    </a:p>
+                  </a:txBody>
+                  <a:tcPr/>
+                </a:tc>
+                <a:tc>
+                  <a:txBody>
+                    <a:bodyPr/>
+                    <a:lstStyle/>
+                    <a:p>
+                      <a:r>
+                        <a:rPr lang="en-US" dirty="0" smtClean="0"/>
+                        <a:t>character</a:t>
                       </a:r>
                       <a:endParaRPr lang="en-US" dirty="0"/>
                     </a:p>
@@ -3257,6 +3300,26 @@
                       <a:r>
                         <a:rPr lang="en-US" dirty="0" smtClean="0"/>
                         <a:t>episodes</a:t>
+                      </a:r>
+                      <a:endParaRPr lang="en-US" dirty="0"/>
+                    </a:p>
+                  </a:txBody>
+                  <a:tcPr/>
+                </a:tc>
+                <a:tc>
+                  <a:txBody>
+                    <a:bodyPr/>
+                    <a:lstStyle/>
+                    <a:p>
+                      <a:r>
+                        <a:rPr lang="en-US" dirty="0" smtClean="0"/>
+                        <a:t>title</a:t>
+                      </a:r>
+                    </a:p>
+                    <a:p>
+                      <a:r>
+                        <a:rPr lang="en-US" dirty="0" smtClean="0"/>
+                        <a:t>episode</a:t>
                       </a:r>
                       <a:endParaRPr lang="en-US" dirty="0"/>
                     </a:p>
@@ -3313,6 +3376,20 @@
                     <a:p>
                       <a:r>
                         <a:rPr lang="en-US" dirty="0" smtClean="0"/>
+                        <a:t>planet</a:t>
+                      </a:r>
+                      <a:endParaRPr lang="en-US" dirty="0"/>
+                    </a:p>
+                  </a:txBody>
+                  <a:tcPr/>
+                </a:tc>
+                <a:tc>
+                  <a:txBody>
+                    <a:bodyPr/>
+                    <a:lstStyle/>
+                    <a:p>
+                      <a:r>
+                        <a:rPr lang="en-US" dirty="0" smtClean="0"/>
                         <a:t>planet = ‘Earth’</a:t>
                       </a:r>
                       <a:endParaRPr lang="en-US" dirty="0"/>
@@ -3330,6 +3407,20 @@
                       <a:r>
                         <a:rPr lang="en-US" dirty="0" smtClean="0"/>
                         <a:t>props</a:t>
+                      </a:r>
+                      <a:endParaRPr lang="en-US" dirty="0"/>
+                    </a:p>
+                  </a:txBody>
+                  <a:tcPr/>
+                </a:tc>
+                <a:tc>
+                  <a:txBody>
+                    <a:bodyPr/>
+                    <a:lstStyle/>
+                    <a:p>
+                      <a:r>
+                        <a:rPr lang="en-US" dirty="0" smtClean="0"/>
+                        <a:t>prop</a:t>
                       </a:r>
                       <a:endParaRPr lang="en-US" dirty="0"/>
                     </a:p>
@@ -3395,6 +3486,20 @@
                     <a:p>
                       <a:r>
                         <a:rPr lang="en-US" dirty="0" smtClean="0"/>
+                        <a:t>species</a:t>
+                      </a:r>
+                      <a:endParaRPr lang="en-US" dirty="0"/>
+                    </a:p>
+                  </a:txBody>
+                  <a:tcPr/>
+                </a:tc>
+                <a:tc>
+                  <a:txBody>
+                    <a:bodyPr/>
+                    <a:lstStyle/>
+                    <a:p>
+                      <a:r>
+                        <a:rPr lang="en-US" dirty="0" smtClean="0"/>
                         <a:t>species = ‘</a:t>
                       </a:r>
                       <a:r>
@@ -3434,6 +3539,20 @@
                       <a:r>
                         <a:rPr lang="en-US" dirty="0" smtClean="0"/>
                         <a:t>things</a:t>
+                      </a:r>
+                      <a:endParaRPr lang="en-US" dirty="0"/>
+                    </a:p>
+                  </a:txBody>
+                  <a:tcPr/>
+                </a:tc>
+                <a:tc>
+                  <a:txBody>
+                    <a:bodyPr/>
+                    <a:lstStyle/>
+                    <a:p>
+                      <a:r>
+                        <a:rPr lang="en-US" smtClean="0"/>
+                        <a:t>thing</a:t>
                       </a:r>
                       <a:endParaRPr lang="en-US" dirty="0"/>
                     </a:p>
@@ -3559,7 +3678,7 @@
       </p:grpSpPr>
       <p:pic>
         <p:nvPicPr>
-          <p:cNvPr id="2" name="Picture 1" descr="Screen shot 2011-06-30 at 14.15.41.png"/>
+          <p:cNvPr id="2" name="Picture 1"/>
           <p:cNvPicPr>
             <a:picLocks noChangeAspect="1"/>
           </p:cNvPicPr>
@@ -3569,7 +3688,7 @@
           <a:blip r:embed="rId2">
             <a:extLst>
               <a:ext uri="{28A0092B-C50C-407E-A947-70E740481C1C}">
-                <a14:useLocalDpi xmlns:a14="http://schemas.microsoft.com/office/drawing/2010/main"/>
+                <a14:useLocalDpi xmlns:a14="http://schemas.microsoft.com/office/drawing/2010/main" val="0"/>
               </a:ext>
             </a:extLst>
           </a:blip>
@@ -3579,8 +3698,8 @@
         </p:blipFill>
         <p:spPr>
           <a:xfrm>
-            <a:off x="785089" y="1288471"/>
-            <a:ext cx="6996548" cy="4385558"/>
+            <a:off x="0" y="210027"/>
+            <a:ext cx="9144000" cy="6229220"/>
           </a:xfrm>
           <a:prstGeom prst="rect">
             <a:avLst/>
@@ -3590,17 +3709,38 @@
       <p:sp>
         <p:nvSpPr>
           <p:cNvPr id="3" name="Title 2"/>
-          <p:cNvSpPr>
-            <a:spLocks noGrp="1"/>
-          </p:cNvSpPr>
-          <p:nvPr>
-            <p:ph type="title"/>
-          </p:nvPr>
-        </p:nvSpPr>
-        <p:spPr/>
-        <p:txBody>
-          <a:bodyPr/>
-          <a:lstStyle/>
+          <p:cNvSpPr txBox="1">
+            <a:spLocks/>
+          </p:cNvSpPr>
+          <p:nvPr/>
+        </p:nvSpPr>
+        <p:spPr>
+          <a:xfrm>
+            <a:off x="5557299" y="274638"/>
+            <a:ext cx="3129501" cy="1143000"/>
+          </a:xfrm>
+          <a:prstGeom prst="rect">
+            <a:avLst/>
+          </a:prstGeom>
+        </p:spPr>
+        <p:txBody>
+          <a:bodyPr/>
+          <a:lstStyle>
+            <a:lvl1pPr algn="ctr" defTabSz="457200" rtl="0" eaLnBrk="1" latinLnBrk="0" hangingPunct="1">
+              <a:spcBef>
+                <a:spcPct val="0"/>
+              </a:spcBef>
+              <a:buNone/>
+              <a:defRPr sz="4400" kern="1200">
+                <a:solidFill>
+                  <a:schemeClr val="tx1"/>
+                </a:solidFill>
+                <a:latin typeface="+mj-lt"/>
+                <a:ea typeface="+mj-ea"/>
+                <a:cs typeface="+mj-cs"/>
+              </a:defRPr>
+            </a:lvl1pPr>
+          </a:lstStyle>
           <a:p>
             <a:r>
               <a:rPr lang="en-US" dirty="0" err="1" smtClean="0"/>
@@ -3617,7 +3757,7 @@
     </p:spTree>
     <p:extLst>
       <p:ext uri="{BB962C8B-B14F-4D97-AF65-F5344CB8AC3E}">
-        <p14:creationId xmlns:p14="http://schemas.microsoft.com/office/powerpoint/2010/main" val="1038678668"/>
+        <p14:creationId xmlns:p14="http://schemas.microsoft.com/office/powerpoint/2010/main" val="2099538040"/>
       </p:ext>
     </p:extLst>
   </p:cSld>

</xml_diff>

<commit_message>
Updated Dr WHo data mode to show EMENMY_OF characters
</commit_message>
<xml_diff>
--- a/presentation/Doctor Who Data Model.pptx
+++ b/presentation/Doctor Who Data Model.pptx
@@ -296,7 +296,7 @@
           <a:p>
             <a:fld id="{6E5CF046-20FD-D64B-A873-CF2D1969ADA3}" type="datetimeFigureOut">
               <a:rPr lang="en-US" smtClean="0"/>
-              <a:t>09/05/2012</a:t>
+              <a:t>08/10/2012</a:t>
             </a:fld>
             <a:endParaRPr lang="en-US"/>
           </a:p>
@@ -466,7 +466,7 @@
           <a:p>
             <a:fld id="{6E5CF046-20FD-D64B-A873-CF2D1969ADA3}" type="datetimeFigureOut">
               <a:rPr lang="en-US" smtClean="0"/>
-              <a:t>09/05/2012</a:t>
+              <a:t>08/10/2012</a:t>
             </a:fld>
             <a:endParaRPr lang="en-US"/>
           </a:p>
@@ -646,7 +646,7 @@
           <a:p>
             <a:fld id="{6E5CF046-20FD-D64B-A873-CF2D1969ADA3}" type="datetimeFigureOut">
               <a:rPr lang="en-US" smtClean="0"/>
-              <a:t>09/05/2012</a:t>
+              <a:t>08/10/2012</a:t>
             </a:fld>
             <a:endParaRPr lang="en-US"/>
           </a:p>
@@ -816,7 +816,7 @@
           <a:p>
             <a:fld id="{6E5CF046-20FD-D64B-A873-CF2D1969ADA3}" type="datetimeFigureOut">
               <a:rPr lang="en-US" smtClean="0"/>
-              <a:t>09/05/2012</a:t>
+              <a:t>08/10/2012</a:t>
             </a:fld>
             <a:endParaRPr lang="en-US"/>
           </a:p>
@@ -1062,7 +1062,7 @@
           <a:p>
             <a:fld id="{6E5CF046-20FD-D64B-A873-CF2D1969ADA3}" type="datetimeFigureOut">
               <a:rPr lang="en-US" smtClean="0"/>
-              <a:t>09/05/2012</a:t>
+              <a:t>08/10/2012</a:t>
             </a:fld>
             <a:endParaRPr lang="en-US"/>
           </a:p>
@@ -1350,7 +1350,7 @@
           <a:p>
             <a:fld id="{6E5CF046-20FD-D64B-A873-CF2D1969ADA3}" type="datetimeFigureOut">
               <a:rPr lang="en-US" smtClean="0"/>
-              <a:t>09/05/2012</a:t>
+              <a:t>08/10/2012</a:t>
             </a:fld>
             <a:endParaRPr lang="en-US"/>
           </a:p>
@@ -1772,7 +1772,7 @@
           <a:p>
             <a:fld id="{6E5CF046-20FD-D64B-A873-CF2D1969ADA3}" type="datetimeFigureOut">
               <a:rPr lang="en-US" smtClean="0"/>
-              <a:t>09/05/2012</a:t>
+              <a:t>08/10/2012</a:t>
             </a:fld>
             <a:endParaRPr lang="en-US"/>
           </a:p>
@@ -1890,7 +1890,7 @@
           <a:p>
             <a:fld id="{6E5CF046-20FD-D64B-A873-CF2D1969ADA3}" type="datetimeFigureOut">
               <a:rPr lang="en-US" smtClean="0"/>
-              <a:t>09/05/2012</a:t>
+              <a:t>08/10/2012</a:t>
             </a:fld>
             <a:endParaRPr lang="en-US"/>
           </a:p>
@@ -1985,7 +1985,7 @@
           <a:p>
             <a:fld id="{6E5CF046-20FD-D64B-A873-CF2D1969ADA3}" type="datetimeFigureOut">
               <a:rPr lang="en-US" smtClean="0"/>
-              <a:t>09/05/2012</a:t>
+              <a:t>08/10/2012</a:t>
             </a:fld>
             <a:endParaRPr lang="en-US"/>
           </a:p>
@@ -2262,7 +2262,7 @@
           <a:p>
             <a:fld id="{6E5CF046-20FD-D64B-A873-CF2D1969ADA3}" type="datetimeFigureOut">
               <a:rPr lang="en-US" smtClean="0"/>
-              <a:t>09/05/2012</a:t>
+              <a:t>08/10/2012</a:t>
             </a:fld>
             <a:endParaRPr lang="en-US"/>
           </a:p>
@@ -2515,7 +2515,7 @@
           <a:p>
             <a:fld id="{6E5CF046-20FD-D64B-A873-CF2D1969ADA3}" type="datetimeFigureOut">
               <a:rPr lang="en-US" smtClean="0"/>
-              <a:t>09/05/2012</a:t>
+              <a:t>08/10/2012</a:t>
             </a:fld>
             <a:endParaRPr lang="en-US"/>
           </a:p>
@@ -2728,7 +2728,7 @@
           <a:p>
             <a:fld id="{6E5CF046-20FD-D64B-A873-CF2D1969ADA3}" type="datetimeFigureOut">
               <a:rPr lang="en-US" smtClean="0"/>
-              <a:t>09/05/2012</a:t>
+              <a:t>08/10/2012</a:t>
             </a:fld>
             <a:endParaRPr lang="en-US"/>
           </a:p>
@@ -3224,7 +3224,6 @@
                         <a:rPr lang="en-US" dirty="0" smtClean="0"/>
                         <a:t>actor</a:t>
                       </a:r>
-                      <a:endParaRPr lang="en-US" dirty="0" smtClean="0"/>
                     </a:p>
                   </a:txBody>
                   <a:tcPr/>
@@ -3618,7 +3617,7 @@
       </p:grpSpPr>
       <p:pic>
         <p:nvPicPr>
-          <p:cNvPr id="4" name="Picture 3" descr="graphs.png"/>
+          <p:cNvPr id="2" name="Picture 1" descr="dr who data model.png"/>
           <p:cNvPicPr>
             <a:picLocks noChangeAspect="1"/>
           </p:cNvPicPr>

</xml_diff>